<commit_message>
Update Chap-4-2 -- Multivariate state-space model.pptx
</commit_message>
<xml_diff>
--- a/Week 3/Lab/Chap-4-2 -- Multivariate state-space model.pptx
+++ b/Week 3/Lab/Chap-4-2 -- Multivariate state-space model.pptx
@@ -5,7 +5,7 @@
     <p:sldMasterId id="2147483672" r:id="rId1"/>
   </p:sldMasterIdLst>
   <p:notesMasterIdLst>
-    <p:notesMasterId r:id="rId7"/>
+    <p:notesMasterId r:id="rId8"/>
   </p:notesMasterIdLst>
   <p:sldIdLst>
     <p:sldId id="266" r:id="rId2"/>
@@ -13,6 +13,7 @@
     <p:sldId id="350" r:id="rId4"/>
     <p:sldId id="349" r:id="rId5"/>
     <p:sldId id="351" r:id="rId6"/>
+    <p:sldId id="352" r:id="rId7"/>
   </p:sldIdLst>
   <p:sldSz cx="9144000" cy="6858000" type="screen4x3"/>
   <p:notesSz cx="6858000" cy="9144000"/>
@@ -3524,6 +3525,21 @@
             </a:pPr>
             <a:endParaRPr lang="en-US" dirty="0"/>
           </a:p>
+          <a:p>
+            <a:pPr marL="0" indent="0">
+              <a:buNone/>
+            </a:pPr>
+            <a:r>
+              <a:rPr lang="en-US" dirty="0"/>
+              <a:t>[Discuss examples]</a:t>
+            </a:r>
+          </a:p>
+          <a:p>
+            <a:pPr marL="0" indent="0">
+              <a:buNone/>
+            </a:pPr>
+            <a:endParaRPr lang="en-US" dirty="0"/>
+          </a:p>
         </p:txBody>
       </p:sp>
     </p:spTree>
@@ -3578,8 +3594,8 @@
           </a:p>
         </p:txBody>
       </p:sp>
-      <mc:AlternateContent xmlns:mc="http://schemas.openxmlformats.org/markup-compatibility/2006">
-        <mc:Choice xmlns:a14="http://schemas.microsoft.com/office/drawing/2010/main" Requires="a14">
+      <mc:AlternateContent xmlns:mc="http://schemas.openxmlformats.org/markup-compatibility/2006" xmlns:a14="http://schemas.microsoft.com/office/drawing/2010/main">
+        <mc:Choice Requires="a14">
           <p:sp>
             <p:nvSpPr>
               <p:cNvPr id="3" name="Content Placeholder 2"/>
@@ -3680,7 +3696,7 @@
                       <m:d>
                         <m:dPr>
                           <m:ctrlPr>
-                            <a:rPr lang="en-US" b="0" i="0" smtClean="0">
+                            <a:rPr lang="en-US" b="0" i="1" smtClean="0">
                               <a:latin typeface="Cambria Math" panose="02040503050406030204" pitchFamily="18" charset="0"/>
                               <a:ea typeface="Cambria Math" panose="02040503050406030204" pitchFamily="18" charset="0"/>
                             </a:rPr>
@@ -3767,7 +3783,7 @@
             </p:txBody>
           </p:sp>
         </mc:Choice>
-        <mc:Fallback>
+        <mc:Fallback xmlns="">
           <p:sp>
             <p:nvSpPr>
               <p:cNvPr id="3" name="Content Placeholder 2"/>
@@ -3853,8 +3869,8 @@
           </a:p>
         </p:txBody>
       </p:sp>
-      <mc:AlternateContent xmlns:mc="http://schemas.openxmlformats.org/markup-compatibility/2006">
-        <mc:Choice xmlns:a14="http://schemas.microsoft.com/office/drawing/2010/main" Requires="a14">
+      <mc:AlternateContent xmlns:mc="http://schemas.openxmlformats.org/markup-compatibility/2006" xmlns:a14="http://schemas.microsoft.com/office/drawing/2010/main">
+        <mc:Choice Requires="a14">
           <p:sp>
             <p:nvSpPr>
               <p:cNvPr id="3" name="Content Placeholder 2"/>
@@ -3955,7 +3971,7 @@
                       <m:d>
                         <m:dPr>
                           <m:ctrlPr>
-                            <a:rPr lang="en-US" b="0" i="0" smtClean="0">
+                            <a:rPr lang="en-US" b="0" i="1" smtClean="0">
                               <a:latin typeface="Cambria Math" panose="02040503050406030204" pitchFamily="18" charset="0"/>
                               <a:ea typeface="Cambria Math" panose="02040503050406030204" pitchFamily="18" charset="0"/>
                             </a:rPr>
@@ -4229,7 +4245,7 @@
                       <m:sSub>
                         <m:sSubPr>
                           <m:ctrlPr>
-                            <a:rPr lang="en-US" b="1" i="0" smtClean="0">
+                            <a:rPr lang="en-US" b="1" i="1" smtClean="0">
                               <a:latin typeface="Cambria Math" panose="02040503050406030204" pitchFamily="18" charset="0"/>
                             </a:rPr>
                           </m:ctrlPr>
@@ -4354,7 +4370,7 @@
                       <m:sSub>
                         <m:sSubPr>
                           <m:ctrlPr>
-                            <a:rPr lang="en-US" b="1" i="0" smtClean="0">
+                            <a:rPr lang="en-US" b="1" i="1" smtClean="0">
                               <a:latin typeface="Cambria Math" panose="02040503050406030204" pitchFamily="18" charset="0"/>
                             </a:rPr>
                           </m:ctrlPr>
@@ -4394,7 +4410,7 @@
                       <m:sSub>
                         <m:sSubPr>
                           <m:ctrlPr>
-                            <a:rPr lang="en-US" b="1" i="0" smtClean="0">
+                            <a:rPr lang="en-US" b="1" i="1" smtClean="0">
                               <a:latin typeface="Cambria Math" panose="02040503050406030204" pitchFamily="18" charset="0"/>
                             </a:rPr>
                           </m:ctrlPr>
@@ -4509,7 +4525,7 @@
             </p:txBody>
           </p:sp>
         </mc:Choice>
-        <mc:Fallback>
+        <mc:Fallback xmlns="">
           <p:sp>
             <p:nvSpPr>
               <p:cNvPr id="3" name="Content Placeholder 2"/>
@@ -4639,8 +4655,8 @@
           </a:p>
         </p:txBody>
       </p:sp>
-      <mc:AlternateContent xmlns:mc="http://schemas.openxmlformats.org/markup-compatibility/2006">
-        <mc:Choice xmlns:a14="http://schemas.microsoft.com/office/drawing/2010/main" Requires="a14">
+      <mc:AlternateContent xmlns:mc="http://schemas.openxmlformats.org/markup-compatibility/2006" xmlns:a14="http://schemas.microsoft.com/office/drawing/2010/main">
+        <mc:Choice Requires="a14">
           <p:sp>
             <p:nvSpPr>
               <p:cNvPr id="4" name="Content Placeholder 2">
@@ -4996,7 +5012,7 @@
             </p:txBody>
           </p:sp>
         </mc:Choice>
-        <mc:Fallback>
+        <mc:Fallback xmlns="">
           <p:sp>
             <p:nvSpPr>
               <p:cNvPr id="4" name="Content Placeholder 2">
@@ -5041,8 +5057,8 @@
           </p:sp>
         </mc:Fallback>
       </mc:AlternateContent>
-      <mc:AlternateContent xmlns:mc="http://schemas.openxmlformats.org/markup-compatibility/2006">
-        <mc:Choice xmlns:a14="http://schemas.microsoft.com/office/drawing/2010/main" Requires="a14">
+      <mc:AlternateContent xmlns:mc="http://schemas.openxmlformats.org/markup-compatibility/2006" xmlns:a14="http://schemas.microsoft.com/office/drawing/2010/main">
+        <mc:Choice Requires="a14">
           <p:sp>
             <p:nvSpPr>
               <p:cNvPr id="5" name="Content Placeholder 2">
@@ -5394,7 +5410,7 @@
             </p:txBody>
           </p:sp>
         </mc:Choice>
-        <mc:Fallback>
+        <mc:Fallback xmlns="">
           <p:sp>
             <p:nvSpPr>
               <p:cNvPr id="5" name="Content Placeholder 2">
@@ -5515,6 +5531,1191 @@
     <p:extLst>
       <p:ext uri="{BB962C8B-B14F-4D97-AF65-F5344CB8AC3E}">
         <p14:creationId xmlns:p14="http://schemas.microsoft.com/office/powerpoint/2010/main" val="2604484829"/>
+      </p:ext>
+    </p:extLst>
+  </p:cSld>
+  <p:clrMapOvr>
+    <a:masterClrMapping/>
+  </p:clrMapOvr>
+</p:sld>
+</file>
+
+<file path=ppt/slides/slide6.xml><?xml version="1.0" encoding="utf-8"?>
+<p:sld xmlns:a="http://schemas.openxmlformats.org/drawingml/2006/main" xmlns:r="http://schemas.openxmlformats.org/officeDocument/2006/relationships" xmlns:p="http://schemas.openxmlformats.org/presentationml/2006/main">
+  <p:cSld>
+    <p:spTree>
+      <p:nvGrpSpPr>
+        <p:cNvPr id="1" name=""/>
+        <p:cNvGrpSpPr/>
+        <p:nvPr/>
+      </p:nvGrpSpPr>
+      <p:grpSpPr>
+        <a:xfrm>
+          <a:off x="0" y="0"/>
+          <a:ext cx="0" cy="0"/>
+          <a:chOff x="0" y="0"/>
+          <a:chExt cx="0" cy="0"/>
+        </a:xfrm>
+      </p:grpSpPr>
+      <p:sp>
+        <p:nvSpPr>
+          <p:cNvPr id="2" name="Title 1"/>
+          <p:cNvSpPr>
+            <a:spLocks noGrp="1"/>
+          </p:cNvSpPr>
+          <p:nvPr>
+            <p:ph type="title"/>
+          </p:nvPr>
+        </p:nvSpPr>
+        <p:spPr/>
+        <p:txBody>
+          <a:bodyPr/>
+          <a:lstStyle/>
+          <a:p>
+            <a:r>
+              <a:rPr lang="en-US" dirty="0"/>
+              <a:t>Multivariate models</a:t>
+            </a:r>
+          </a:p>
+        </p:txBody>
+      </p:sp>
+      <p:sp>
+        <p:nvSpPr>
+          <p:cNvPr id="3" name="Content Placeholder 2"/>
+          <p:cNvSpPr>
+            <a:spLocks noGrp="1"/>
+          </p:cNvSpPr>
+          <p:nvPr>
+            <p:ph idx="1"/>
+          </p:nvPr>
+        </p:nvSpPr>
+        <p:spPr>
+          <a:xfrm>
+            <a:off x="76200" y="838200"/>
+            <a:ext cx="8991600" cy="809231"/>
+          </a:xfrm>
+        </p:spPr>
+        <p:txBody>
+          <a:bodyPr>
+            <a:normAutofit/>
+          </a:bodyPr>
+          <a:lstStyle/>
+          <a:p>
+            <a:pPr marL="0" indent="0">
+              <a:buNone/>
+            </a:pPr>
+            <a:r>
+              <a:rPr lang="en-US" dirty="0"/>
+              <a:t>Rotations for factor models</a:t>
+            </a:r>
+            <a:endParaRPr lang="en-US" b="1" dirty="0"/>
+          </a:p>
+          <a:p>
+            <a:pPr marL="0" indent="0">
+              <a:buNone/>
+            </a:pPr>
+            <a:endParaRPr lang="en-US" b="1" dirty="0"/>
+          </a:p>
+        </p:txBody>
+      </p:sp>
+      <mc:AlternateContent xmlns:mc="http://schemas.openxmlformats.org/markup-compatibility/2006">
+        <mc:Choice xmlns:a14="http://schemas.microsoft.com/office/drawing/2010/main" Requires="a14">
+          <p:sp>
+            <p:nvSpPr>
+              <p:cNvPr id="4" name="Content Placeholder 2">
+                <a:extLst>
+                  <a:ext uri="{FF2B5EF4-FFF2-40B4-BE49-F238E27FC236}">
+                    <a16:creationId xmlns:a16="http://schemas.microsoft.com/office/drawing/2014/main" id="{A83154BA-CCBC-46E9-901F-175DD1B1AEB6}"/>
+                  </a:ext>
+                </a:extLst>
+              </p:cNvPr>
+              <p:cNvSpPr txBox="1">
+                <a:spLocks/>
+              </p:cNvSpPr>
+              <p:nvPr/>
+            </p:nvSpPr>
+            <p:spPr>
+              <a:xfrm>
+                <a:off x="0" y="1549820"/>
+                <a:ext cx="9144000" cy="5308180"/>
+              </a:xfrm>
+              <a:prstGeom prst="rect">
+                <a:avLst/>
+              </a:prstGeom>
+            </p:spPr>
+            <p:txBody>
+              <a:bodyPr vert="horz" lIns="91440" tIns="45720" rIns="91440" bIns="45720" rtlCol="0">
+                <a:normAutofit fontScale="62500" lnSpcReduction="20000"/>
+              </a:bodyPr>
+              <a:lstStyle>
+                <a:lvl1pPr marL="342900" indent="-342900" algn="l" defTabSz="914400" rtl="0" eaLnBrk="1" latinLnBrk="0" hangingPunct="1">
+                  <a:spcBef>
+                    <a:spcPts val="600"/>
+                  </a:spcBef>
+                  <a:spcAft>
+                    <a:spcPts val="600"/>
+                  </a:spcAft>
+                  <a:buFont typeface="Arial" pitchFamily="34" charset="0"/>
+                  <a:buChar char="•"/>
+                  <a:defRPr sz="2800" kern="1200">
+                    <a:solidFill>
+                      <a:schemeClr val="tx1"/>
+                    </a:solidFill>
+                    <a:latin typeface="+mn-lt"/>
+                    <a:ea typeface="+mn-ea"/>
+                    <a:cs typeface="+mn-cs"/>
+                  </a:defRPr>
+                </a:lvl1pPr>
+                <a:lvl2pPr marL="742950" indent="-285750" algn="l" defTabSz="914400" rtl="0" eaLnBrk="1" latinLnBrk="0" hangingPunct="1">
+                  <a:spcBef>
+                    <a:spcPts val="600"/>
+                  </a:spcBef>
+                  <a:spcAft>
+                    <a:spcPts val="600"/>
+                  </a:spcAft>
+                  <a:buFont typeface="Arial" pitchFamily="34" charset="0"/>
+                  <a:buChar char="–"/>
+                  <a:defRPr sz="2400" kern="1200">
+                    <a:solidFill>
+                      <a:schemeClr val="tx1"/>
+                    </a:solidFill>
+                    <a:latin typeface="+mn-lt"/>
+                    <a:ea typeface="+mn-ea"/>
+                    <a:cs typeface="+mn-cs"/>
+                  </a:defRPr>
+                </a:lvl2pPr>
+                <a:lvl3pPr marL="1143000" indent="-228600" algn="l" defTabSz="914400" rtl="0" eaLnBrk="1" latinLnBrk="0" hangingPunct="1">
+                  <a:spcBef>
+                    <a:spcPts val="600"/>
+                  </a:spcBef>
+                  <a:spcAft>
+                    <a:spcPts val="600"/>
+                  </a:spcAft>
+                  <a:buFont typeface="Arial" pitchFamily="34" charset="0"/>
+                  <a:buChar char="•"/>
+                  <a:defRPr sz="2000" kern="1200">
+                    <a:solidFill>
+                      <a:schemeClr val="tx1"/>
+                    </a:solidFill>
+                    <a:latin typeface="+mn-lt"/>
+                    <a:ea typeface="+mn-ea"/>
+                    <a:cs typeface="+mn-cs"/>
+                  </a:defRPr>
+                </a:lvl3pPr>
+                <a:lvl4pPr marL="1600200" indent="-228600" algn="l" defTabSz="914400" rtl="0" eaLnBrk="1" latinLnBrk="0" hangingPunct="1">
+                  <a:spcBef>
+                    <a:spcPts val="600"/>
+                  </a:spcBef>
+                  <a:spcAft>
+                    <a:spcPts val="600"/>
+                  </a:spcAft>
+                  <a:buFont typeface="Arial" pitchFamily="34" charset="0"/>
+                  <a:buChar char="–"/>
+                  <a:defRPr sz="1800" kern="1200">
+                    <a:solidFill>
+                      <a:schemeClr val="tx1"/>
+                    </a:solidFill>
+                    <a:latin typeface="+mn-lt"/>
+                    <a:ea typeface="+mn-ea"/>
+                    <a:cs typeface="+mn-cs"/>
+                  </a:defRPr>
+                </a:lvl4pPr>
+                <a:lvl5pPr marL="2057400" indent="-228600" algn="l" defTabSz="914400" rtl="0" eaLnBrk="1" latinLnBrk="0" hangingPunct="1">
+                  <a:spcBef>
+                    <a:spcPts val="600"/>
+                  </a:spcBef>
+                  <a:spcAft>
+                    <a:spcPts val="600"/>
+                  </a:spcAft>
+                  <a:buFont typeface="Arial" pitchFamily="34" charset="0"/>
+                  <a:buChar char="»"/>
+                  <a:defRPr sz="1800" kern="1200">
+                    <a:solidFill>
+                      <a:schemeClr val="tx1"/>
+                    </a:solidFill>
+                    <a:latin typeface="+mn-lt"/>
+                    <a:ea typeface="+mn-ea"/>
+                    <a:cs typeface="+mn-cs"/>
+                  </a:defRPr>
+                </a:lvl5pPr>
+                <a:lvl6pPr marL="2514600" indent="-228600" algn="l" defTabSz="914400" rtl="0" eaLnBrk="1" latinLnBrk="0" hangingPunct="1">
+                  <a:spcBef>
+                    <a:spcPct val="20000"/>
+                  </a:spcBef>
+                  <a:buFont typeface="Arial" pitchFamily="34" charset="0"/>
+                  <a:buChar char="•"/>
+                  <a:defRPr sz="2000" kern="1200">
+                    <a:solidFill>
+                      <a:schemeClr val="tx1"/>
+                    </a:solidFill>
+                    <a:latin typeface="+mn-lt"/>
+                    <a:ea typeface="+mn-ea"/>
+                    <a:cs typeface="+mn-cs"/>
+                  </a:defRPr>
+                </a:lvl6pPr>
+                <a:lvl7pPr marL="2971800" indent="-228600" algn="l" defTabSz="914400" rtl="0" eaLnBrk="1" latinLnBrk="0" hangingPunct="1">
+                  <a:spcBef>
+                    <a:spcPct val="20000"/>
+                  </a:spcBef>
+                  <a:buFont typeface="Arial" pitchFamily="34" charset="0"/>
+                  <a:buChar char="•"/>
+                  <a:defRPr sz="2000" kern="1200">
+                    <a:solidFill>
+                      <a:schemeClr val="tx1"/>
+                    </a:solidFill>
+                    <a:latin typeface="+mn-lt"/>
+                    <a:ea typeface="+mn-ea"/>
+                    <a:cs typeface="+mn-cs"/>
+                  </a:defRPr>
+                </a:lvl7pPr>
+                <a:lvl8pPr marL="3429000" indent="-228600" algn="l" defTabSz="914400" rtl="0" eaLnBrk="1" latinLnBrk="0" hangingPunct="1">
+                  <a:spcBef>
+                    <a:spcPct val="20000"/>
+                  </a:spcBef>
+                  <a:buFont typeface="Arial" pitchFamily="34" charset="0"/>
+                  <a:buChar char="•"/>
+                  <a:defRPr sz="2000" kern="1200">
+                    <a:solidFill>
+                      <a:schemeClr val="tx1"/>
+                    </a:solidFill>
+                    <a:latin typeface="+mn-lt"/>
+                    <a:ea typeface="+mn-ea"/>
+                    <a:cs typeface="+mn-cs"/>
+                  </a:defRPr>
+                </a:lvl8pPr>
+                <a:lvl9pPr marL="3886200" indent="-228600" algn="l" defTabSz="914400" rtl="0" eaLnBrk="1" latinLnBrk="0" hangingPunct="1">
+                  <a:spcBef>
+                    <a:spcPct val="20000"/>
+                  </a:spcBef>
+                  <a:buFont typeface="Arial" pitchFamily="34" charset="0"/>
+                  <a:buChar char="•"/>
+                  <a:defRPr sz="2000" kern="1200">
+                    <a:solidFill>
+                      <a:schemeClr val="tx1"/>
+                    </a:solidFill>
+                    <a:latin typeface="+mn-lt"/>
+                    <a:ea typeface="+mn-ea"/>
+                    <a:cs typeface="+mn-cs"/>
+                  </a:defRPr>
+                </a:lvl9pPr>
+              </a:lstStyle>
+              <a:p>
+                <a:pPr marL="0" indent="0">
+                  <a:buFont typeface="Arial" pitchFamily="34" charset="0"/>
+                  <a:buNone/>
+                </a:pPr>
+                <a:r>
+                  <a:rPr lang="en-US" dirty="0"/>
+                  <a:t>Dynamic factor analysis</a:t>
+                </a:r>
+              </a:p>
+              <a:p>
+                <a:pPr marL="0" indent="0">
+                  <a:buNone/>
+                </a:pPr>
+                <a14:m>
+                  <m:oMathPara xmlns:m="http://schemas.openxmlformats.org/officeDocument/2006/math">
+                    <m:oMathParaPr>
+                      <m:jc m:val="centerGroup"/>
+                    </m:oMathParaPr>
+                    <m:oMath xmlns:m="http://schemas.openxmlformats.org/officeDocument/2006/math">
+                      <m:sSub>
+                        <m:sSubPr>
+                          <m:ctrlPr>
+                            <a:rPr lang="en-US" b="1" i="0" smtClean="0">
+                              <a:latin typeface="Cambria Math" panose="02040503050406030204" pitchFamily="18" charset="0"/>
+                            </a:rPr>
+                          </m:ctrlPr>
+                        </m:sSubPr>
+                        <m:e>
+                          <m:r>
+                            <a:rPr lang="en-US" b="1" i="0" smtClean="0">
+                              <a:latin typeface="Cambria Math" panose="02040503050406030204" pitchFamily="18" charset="0"/>
+                            </a:rPr>
+                            <m:t>𝐲</m:t>
+                          </m:r>
+                        </m:e>
+                        <m:sub>
+                          <m:r>
+                            <a:rPr lang="en-US" b="0" i="1" smtClean="0">
+                              <a:latin typeface="Cambria Math" panose="02040503050406030204" pitchFamily="18" charset="0"/>
+                            </a:rPr>
+                            <m:t>𝑡</m:t>
+                          </m:r>
+                        </m:sub>
+                      </m:sSub>
+                      <m:r>
+                        <a:rPr lang="en-US" b="1" i="0" smtClean="0">
+                          <a:latin typeface="Cambria Math" panose="02040503050406030204" pitchFamily="18" charset="0"/>
+                        </a:rPr>
+                        <m:t>~</m:t>
+                      </m:r>
+                      <m:r>
+                        <m:rPr>
+                          <m:sty m:val="p"/>
+                        </m:rPr>
+                        <a:rPr lang="en-US" b="0" i="0" smtClean="0">
+                          <a:latin typeface="Cambria Math" panose="02040503050406030204" pitchFamily="18" charset="0"/>
+                        </a:rPr>
+                        <m:t>MVN</m:t>
+                      </m:r>
+                      <m:d>
+                        <m:dPr>
+                          <m:ctrlPr>
+                            <a:rPr lang="en-US" b="0" i="0" smtClean="0">
+                              <a:latin typeface="Cambria Math" panose="02040503050406030204" pitchFamily="18" charset="0"/>
+                            </a:rPr>
+                          </m:ctrlPr>
+                        </m:dPr>
+                        <m:e>
+                          <m:r>
+                            <a:rPr lang="en-US" b="1" i="0" smtClean="0">
+                              <a:latin typeface="Cambria Math" panose="02040503050406030204" pitchFamily="18" charset="0"/>
+                            </a:rPr>
+                            <m:t>𝛂</m:t>
+                          </m:r>
+                          <m:r>
+                            <a:rPr lang="en-US" b="1" i="1" smtClean="0">
+                              <a:latin typeface="Cambria Math" panose="02040503050406030204" pitchFamily="18" charset="0"/>
+                            </a:rPr>
+                            <m:t>+</m:t>
+                          </m:r>
+                          <m:sSub>
+                            <m:sSubPr>
+                              <m:ctrlPr>
+                                <a:rPr lang="en-US" b="1" i="1">
+                                  <a:latin typeface="Cambria Math" panose="02040503050406030204" pitchFamily="18" charset="0"/>
+                                </a:rPr>
+                              </m:ctrlPr>
+                            </m:sSubPr>
+                            <m:e>
+                              <m:r>
+                                <a:rPr lang="en-US" b="1" i="0" smtClean="0">
+                                  <a:latin typeface="Cambria Math" panose="02040503050406030204" pitchFamily="18" charset="0"/>
+                                </a:rPr>
+                                <m:t>𝐱</m:t>
+                              </m:r>
+                            </m:e>
+                            <m:sub>
+                              <m:r>
+                                <a:rPr lang="en-US" i="1">
+                                  <a:latin typeface="Cambria Math" panose="02040503050406030204" pitchFamily="18" charset="0"/>
+                                </a:rPr>
+                                <m:t>𝑡</m:t>
+                              </m:r>
+                            </m:sub>
+                          </m:sSub>
+                          <m:r>
+                            <a:rPr lang="en-US" b="1" i="1" smtClean="0">
+                              <a:latin typeface="Cambria Math" panose="02040503050406030204" pitchFamily="18" charset="0"/>
+                            </a:rPr>
+                            <m:t>,</m:t>
+                          </m:r>
+                          <m:r>
+                            <a:rPr lang="en-US" b="1" i="0" smtClean="0">
+                              <a:latin typeface="Cambria Math" panose="02040503050406030204" pitchFamily="18" charset="0"/>
+                            </a:rPr>
+                            <m:t>𝐕</m:t>
+                          </m:r>
+                        </m:e>
+                      </m:d>
+                    </m:oMath>
+                    <m:oMath xmlns:m="http://schemas.openxmlformats.org/officeDocument/2006/math">
+                      <m:sSub>
+                        <m:sSubPr>
+                          <m:ctrlPr>
+                            <a:rPr lang="en-US" b="0" i="1" smtClean="0">
+                              <a:latin typeface="Cambria Math" panose="02040503050406030204" pitchFamily="18" charset="0"/>
+                            </a:rPr>
+                          </m:ctrlPr>
+                        </m:sSubPr>
+                        <m:e>
+                          <m:r>
+                            <a:rPr lang="en-US" b="1" i="0" smtClean="0">
+                              <a:latin typeface="Cambria Math" panose="02040503050406030204" pitchFamily="18" charset="0"/>
+                            </a:rPr>
+                            <m:t>𝐱</m:t>
+                          </m:r>
+                        </m:e>
+                        <m:sub>
+                          <m:r>
+                            <a:rPr lang="en-US" b="0" i="1" smtClean="0">
+                              <a:latin typeface="Cambria Math" panose="02040503050406030204" pitchFamily="18" charset="0"/>
+                            </a:rPr>
+                            <m:t>𝑡</m:t>
+                          </m:r>
+                          <m:r>
+                            <a:rPr lang="en-US" b="0" i="1" smtClean="0">
+                              <a:latin typeface="Cambria Math" panose="02040503050406030204" pitchFamily="18" charset="0"/>
+                            </a:rPr>
+                            <m:t>+1</m:t>
+                          </m:r>
+                        </m:sub>
+                      </m:sSub>
+                      <m:r>
+                        <a:rPr lang="en-US" b="0" i="1" smtClean="0">
+                          <a:latin typeface="Cambria Math" panose="02040503050406030204" pitchFamily="18" charset="0"/>
+                        </a:rPr>
+                        <m:t>=</m:t>
+                      </m:r>
+                      <m:sSub>
+                        <m:sSubPr>
+                          <m:ctrlPr>
+                            <a:rPr lang="en-US" b="0" i="1" smtClean="0">
+                              <a:latin typeface="Cambria Math" panose="02040503050406030204" pitchFamily="18" charset="0"/>
+                            </a:rPr>
+                          </m:ctrlPr>
+                        </m:sSubPr>
+                        <m:e>
+                          <m:r>
+                            <a:rPr lang="en-US" b="1" i="0" smtClean="0">
+                              <a:latin typeface="Cambria Math" panose="02040503050406030204" pitchFamily="18" charset="0"/>
+                            </a:rPr>
+                            <m:t>𝐱</m:t>
+                          </m:r>
+                        </m:e>
+                        <m:sub>
+                          <m:r>
+                            <a:rPr lang="en-US" b="0" i="1" smtClean="0">
+                              <a:latin typeface="Cambria Math" panose="02040503050406030204" pitchFamily="18" charset="0"/>
+                            </a:rPr>
+                            <m:t>𝑡</m:t>
+                          </m:r>
+                        </m:sub>
+                      </m:sSub>
+                      <m:r>
+                        <a:rPr lang="en-US" b="0" i="1" smtClean="0">
+                          <a:latin typeface="Cambria Math" panose="02040503050406030204" pitchFamily="18" charset="0"/>
+                        </a:rPr>
+                        <m:t>+</m:t>
+                      </m:r>
+                      <m:r>
+                        <a:rPr lang="en-US" b="1" i="0" smtClean="0">
+                          <a:latin typeface="Cambria Math" panose="02040503050406030204" pitchFamily="18" charset="0"/>
+                        </a:rPr>
+                        <m:t>𝐋</m:t>
+                      </m:r>
+                      <m:sSub>
+                        <m:sSubPr>
+                          <m:ctrlPr>
+                            <a:rPr lang="en-US" b="0" i="1" smtClean="0">
+                              <a:latin typeface="Cambria Math" panose="02040503050406030204" pitchFamily="18" charset="0"/>
+                            </a:rPr>
+                          </m:ctrlPr>
+                        </m:sSubPr>
+                        <m:e>
+                          <m:r>
+                            <a:rPr lang="en-US" b="1" i="0" smtClean="0">
+                              <a:latin typeface="Cambria Math" panose="02040503050406030204" pitchFamily="18" charset="0"/>
+                            </a:rPr>
+                            <m:t>𝛜</m:t>
+                          </m:r>
+                        </m:e>
+                        <m:sub>
+                          <m:r>
+                            <a:rPr lang="en-US" b="0" i="1" smtClean="0">
+                              <a:latin typeface="Cambria Math" panose="02040503050406030204" pitchFamily="18" charset="0"/>
+                            </a:rPr>
+                            <m:t>𝑡</m:t>
+                          </m:r>
+                        </m:sub>
+                      </m:sSub>
+                    </m:oMath>
+                  </m:oMathPara>
+                </a14:m>
+                <a:endParaRPr lang="en-US" b="0" dirty="0"/>
+              </a:p>
+              <a:p>
+                <a:pPr marL="0" indent="0">
+                  <a:buNone/>
+                </a:pPr>
+                <a14:m>
+                  <m:oMathPara xmlns:m="http://schemas.openxmlformats.org/officeDocument/2006/math">
+                    <m:oMathParaPr>
+                      <m:jc m:val="centerGroup"/>
+                    </m:oMathParaPr>
+                    <m:oMath xmlns:m="http://schemas.openxmlformats.org/officeDocument/2006/math">
+                      <m:sSub>
+                        <m:sSubPr>
+                          <m:ctrlPr>
+                            <a:rPr lang="en-US" b="0" i="1" smtClean="0">
+                              <a:latin typeface="Cambria Math" panose="02040503050406030204" pitchFamily="18" charset="0"/>
+                            </a:rPr>
+                          </m:ctrlPr>
+                        </m:sSubPr>
+                        <m:e>
+                          <m:r>
+                            <a:rPr lang="en-US" b="1" i="0" smtClean="0">
+                              <a:latin typeface="Cambria Math" panose="02040503050406030204" pitchFamily="18" charset="0"/>
+                            </a:rPr>
+                            <m:t>𝛜</m:t>
+                          </m:r>
+                        </m:e>
+                        <m:sub>
+                          <m:r>
+                            <a:rPr lang="en-US" b="0" i="1" smtClean="0">
+                              <a:latin typeface="Cambria Math" panose="02040503050406030204" pitchFamily="18" charset="0"/>
+                            </a:rPr>
+                            <m:t>𝑡</m:t>
+                          </m:r>
+                        </m:sub>
+                      </m:sSub>
+                      <m:r>
+                        <a:rPr lang="en-US" b="0" i="1" smtClean="0">
+                          <a:latin typeface="Cambria Math" panose="02040503050406030204" pitchFamily="18" charset="0"/>
+                        </a:rPr>
+                        <m:t>~</m:t>
+                      </m:r>
+                      <m:r>
+                        <m:rPr>
+                          <m:sty m:val="p"/>
+                        </m:rPr>
+                        <a:rPr lang="en-US" b="0" i="0" smtClean="0">
+                          <a:latin typeface="Cambria Math" panose="02040503050406030204" pitchFamily="18" charset="0"/>
+                        </a:rPr>
+                        <m:t>MVN</m:t>
+                      </m:r>
+                      <m:r>
+                        <a:rPr lang="en-US" b="0" i="1" smtClean="0">
+                          <a:latin typeface="Cambria Math" panose="02040503050406030204" pitchFamily="18" charset="0"/>
+                        </a:rPr>
+                        <m:t>(</m:t>
+                      </m:r>
+                      <m:r>
+                        <a:rPr lang="en-US" b="1" i="1" smtClean="0">
+                          <a:latin typeface="Cambria Math" panose="02040503050406030204" pitchFamily="18" charset="0"/>
+                        </a:rPr>
+                        <m:t>𝟎</m:t>
+                      </m:r>
+                      <m:r>
+                        <a:rPr lang="en-US" b="0" i="1" smtClean="0">
+                          <a:latin typeface="Cambria Math" panose="02040503050406030204" pitchFamily="18" charset="0"/>
+                        </a:rPr>
+                        <m:t>,</m:t>
+                      </m:r>
+                      <m:r>
+                        <a:rPr lang="en-US" b="1" i="0" smtClean="0">
+                          <a:latin typeface="Cambria Math" panose="02040503050406030204" pitchFamily="18" charset="0"/>
+                        </a:rPr>
+                        <m:t>𝐈</m:t>
+                      </m:r>
+                      <m:sSup>
+                        <m:sSupPr>
+                          <m:ctrlPr>
+                            <a:rPr lang="en-US" b="0" i="1" smtClean="0">
+                              <a:latin typeface="Cambria Math" panose="02040503050406030204" pitchFamily="18" charset="0"/>
+                            </a:rPr>
+                          </m:ctrlPr>
+                        </m:sSupPr>
+                        <m:e>
+                          <m:r>
+                            <a:rPr lang="en-US" b="0" i="1" smtClean="0">
+                              <a:latin typeface="Cambria Math" panose="02040503050406030204" pitchFamily="18" charset="0"/>
+                            </a:rPr>
+                            <m:t>𝜎</m:t>
+                          </m:r>
+                        </m:e>
+                        <m:sup>
+                          <m:r>
+                            <a:rPr lang="en-US" b="0" i="1" smtClean="0">
+                              <a:latin typeface="Cambria Math" panose="02040503050406030204" pitchFamily="18" charset="0"/>
+                            </a:rPr>
+                            <m:t>2</m:t>
+                          </m:r>
+                        </m:sup>
+                      </m:sSup>
+                      <m:r>
+                        <a:rPr lang="en-US" b="0" i="1" smtClean="0">
+                          <a:latin typeface="Cambria Math" panose="02040503050406030204" pitchFamily="18" charset="0"/>
+                        </a:rPr>
+                        <m:t>)</m:t>
+                      </m:r>
+                    </m:oMath>
+                  </m:oMathPara>
+                </a14:m>
+                <a:endParaRPr lang="en-US" b="0" dirty="0"/>
+              </a:p>
+              <a:p>
+                <a:pPr marL="0" indent="0">
+                  <a:buNone/>
+                </a:pPr>
+                <a:r>
+                  <a:rPr lang="en-US" dirty="0"/>
+                  <a:t>Rotations:</a:t>
+                </a:r>
+              </a:p>
+              <a:p>
+                <a:pPr marL="0" indent="0">
+                  <a:buNone/>
+                </a:pPr>
+                <a14:m>
+                  <m:oMathPara xmlns:m="http://schemas.openxmlformats.org/officeDocument/2006/math">
+                    <m:oMathParaPr>
+                      <m:jc m:val="centerGroup"/>
+                    </m:oMathParaPr>
+                    <m:oMath xmlns:m="http://schemas.openxmlformats.org/officeDocument/2006/math">
+                      <m:sSub>
+                        <m:sSubPr>
+                          <m:ctrlPr>
+                            <a:rPr lang="en-US" i="1">
+                              <a:latin typeface="Cambria Math" panose="02040503050406030204" pitchFamily="18" charset="0"/>
+                            </a:rPr>
+                          </m:ctrlPr>
+                        </m:sSubPr>
+                        <m:e>
+                          <m:r>
+                            <a:rPr lang="en-US" b="1">
+                              <a:latin typeface="Cambria Math" panose="02040503050406030204" pitchFamily="18" charset="0"/>
+                            </a:rPr>
+                            <m:t>𝐱</m:t>
+                          </m:r>
+                        </m:e>
+                        <m:sub>
+                          <m:r>
+                            <a:rPr lang="en-US" i="1">
+                              <a:latin typeface="Cambria Math" panose="02040503050406030204" pitchFamily="18" charset="0"/>
+                            </a:rPr>
+                            <m:t>𝑡</m:t>
+                          </m:r>
+                          <m:r>
+                            <a:rPr lang="en-US" i="1">
+                              <a:latin typeface="Cambria Math" panose="02040503050406030204" pitchFamily="18" charset="0"/>
+                            </a:rPr>
+                            <m:t>+1</m:t>
+                          </m:r>
+                        </m:sub>
+                      </m:sSub>
+                      <m:r>
+                        <a:rPr lang="en-US" i="1">
+                          <a:latin typeface="Cambria Math" panose="02040503050406030204" pitchFamily="18" charset="0"/>
+                        </a:rPr>
+                        <m:t>=</m:t>
+                      </m:r>
+                      <m:sSub>
+                        <m:sSubPr>
+                          <m:ctrlPr>
+                            <a:rPr lang="en-US" i="1">
+                              <a:latin typeface="Cambria Math" panose="02040503050406030204" pitchFamily="18" charset="0"/>
+                            </a:rPr>
+                          </m:ctrlPr>
+                        </m:sSubPr>
+                        <m:e>
+                          <m:r>
+                            <a:rPr lang="en-US" b="1">
+                              <a:latin typeface="Cambria Math" panose="02040503050406030204" pitchFamily="18" charset="0"/>
+                            </a:rPr>
+                            <m:t>𝐱</m:t>
+                          </m:r>
+                        </m:e>
+                        <m:sub>
+                          <m:r>
+                            <a:rPr lang="en-US" i="1">
+                              <a:latin typeface="Cambria Math" panose="02040503050406030204" pitchFamily="18" charset="0"/>
+                            </a:rPr>
+                            <m:t>𝑡</m:t>
+                          </m:r>
+                        </m:sub>
+                      </m:sSub>
+                      <m:r>
+                        <a:rPr lang="en-US" i="1">
+                          <a:latin typeface="Cambria Math" panose="02040503050406030204" pitchFamily="18" charset="0"/>
+                        </a:rPr>
+                        <m:t>+</m:t>
+                      </m:r>
+                      <m:r>
+                        <a:rPr lang="en-US" b="1">
+                          <a:latin typeface="Cambria Math" panose="02040503050406030204" pitchFamily="18" charset="0"/>
+                        </a:rPr>
+                        <m:t>𝐋</m:t>
+                      </m:r>
+                      <m:sSup>
+                        <m:sSupPr>
+                          <m:ctrlPr>
+                            <a:rPr lang="en-US" b="0" i="1" smtClean="0">
+                              <a:latin typeface="Cambria Math" panose="02040503050406030204" pitchFamily="18" charset="0"/>
+                            </a:rPr>
+                          </m:ctrlPr>
+                        </m:sSupPr>
+                        <m:e>
+                          <m:r>
+                            <a:rPr lang="en-US" b="1" i="0" smtClean="0">
+                              <a:latin typeface="Cambria Math" panose="02040503050406030204" pitchFamily="18" charset="0"/>
+                            </a:rPr>
+                            <m:t>𝐇</m:t>
+                          </m:r>
+                        </m:e>
+                        <m:sup>
+                          <m:r>
+                            <a:rPr lang="en-US" b="0" i="1" smtClean="0">
+                              <a:latin typeface="Cambria Math" panose="02040503050406030204" pitchFamily="18" charset="0"/>
+                            </a:rPr>
+                            <m:t>−1</m:t>
+                          </m:r>
+                        </m:sup>
+                      </m:sSup>
+                      <m:r>
+                        <a:rPr lang="en-US" b="1">
+                          <a:latin typeface="Cambria Math" panose="02040503050406030204" pitchFamily="18" charset="0"/>
+                        </a:rPr>
+                        <m:t>𝐇</m:t>
+                      </m:r>
+                      <m:sSub>
+                        <m:sSubPr>
+                          <m:ctrlPr>
+                            <a:rPr lang="en-US" i="1">
+                              <a:latin typeface="Cambria Math" panose="02040503050406030204" pitchFamily="18" charset="0"/>
+                            </a:rPr>
+                          </m:ctrlPr>
+                        </m:sSubPr>
+                        <m:e>
+                          <m:r>
+                            <a:rPr lang="en-US" b="1">
+                              <a:latin typeface="Cambria Math" panose="02040503050406030204" pitchFamily="18" charset="0"/>
+                            </a:rPr>
+                            <m:t>𝛜</m:t>
+                          </m:r>
+                        </m:e>
+                        <m:sub>
+                          <m:r>
+                            <a:rPr lang="en-US" i="1">
+                              <a:latin typeface="Cambria Math" panose="02040503050406030204" pitchFamily="18" charset="0"/>
+                            </a:rPr>
+                            <m:t>𝑡</m:t>
+                          </m:r>
+                        </m:sub>
+                      </m:sSub>
+                    </m:oMath>
+                  </m:oMathPara>
+                </a14:m>
+                <a:endParaRPr lang="en-US" dirty="0"/>
+              </a:p>
+              <a:p>
+                <a:pPr marL="0" indent="0">
+                  <a:buNone/>
+                </a:pPr>
+                <a:r>
+                  <a:rPr lang="en-US" dirty="0"/>
+                  <a:t>And then interpret:</a:t>
+                </a:r>
+              </a:p>
+              <a:p>
+                <a:pPr marL="0" indent="0">
+                  <a:buNone/>
+                </a:pPr>
+                <a14:m>
+                  <m:oMathPara xmlns:m="http://schemas.openxmlformats.org/officeDocument/2006/math">
+                    <m:oMathParaPr>
+                      <m:jc m:val="centerGroup"/>
+                    </m:oMathParaPr>
+                    <m:oMath xmlns:m="http://schemas.openxmlformats.org/officeDocument/2006/math">
+                      <m:sSup>
+                        <m:sSupPr>
+                          <m:ctrlPr>
+                            <a:rPr lang="en-US" b="1" i="0" smtClean="0">
+                              <a:latin typeface="Cambria Math" panose="02040503050406030204" pitchFamily="18" charset="0"/>
+                            </a:rPr>
+                          </m:ctrlPr>
+                        </m:sSupPr>
+                        <m:e>
+                          <m:r>
+                            <a:rPr lang="en-US" b="1" i="0" smtClean="0">
+                              <a:latin typeface="Cambria Math" panose="02040503050406030204" pitchFamily="18" charset="0"/>
+                            </a:rPr>
+                            <m:t>𝐋</m:t>
+                          </m:r>
+                        </m:e>
+                        <m:sup>
+                          <m:r>
+                            <a:rPr lang="en-US" b="1" i="0" smtClean="0">
+                              <a:latin typeface="Cambria Math" panose="02040503050406030204" pitchFamily="18" charset="0"/>
+                            </a:rPr>
+                            <m:t>∗</m:t>
+                          </m:r>
+                        </m:sup>
+                      </m:sSup>
+                      <m:r>
+                        <a:rPr lang="en-US" b="1" i="0" smtClean="0">
+                          <a:latin typeface="Cambria Math" panose="02040503050406030204" pitchFamily="18" charset="0"/>
+                        </a:rPr>
+                        <m:t>=</m:t>
+                      </m:r>
+                      <m:r>
+                        <a:rPr lang="en-US" b="1">
+                          <a:latin typeface="Cambria Math" panose="02040503050406030204" pitchFamily="18" charset="0"/>
+                        </a:rPr>
+                        <m:t>𝐋</m:t>
+                      </m:r>
+                      <m:sSup>
+                        <m:sSupPr>
+                          <m:ctrlPr>
+                            <a:rPr lang="en-US" i="1">
+                              <a:latin typeface="Cambria Math" panose="02040503050406030204" pitchFamily="18" charset="0"/>
+                            </a:rPr>
+                          </m:ctrlPr>
+                        </m:sSupPr>
+                        <m:e>
+                          <m:r>
+                            <a:rPr lang="en-US" b="1">
+                              <a:latin typeface="Cambria Math" panose="02040503050406030204" pitchFamily="18" charset="0"/>
+                            </a:rPr>
+                            <m:t>𝐇</m:t>
+                          </m:r>
+                        </m:e>
+                        <m:sup>
+                          <m:r>
+                            <a:rPr lang="en-US" i="1">
+                              <a:latin typeface="Cambria Math" panose="02040503050406030204" pitchFamily="18" charset="0"/>
+                            </a:rPr>
+                            <m:t>−1</m:t>
+                          </m:r>
+                        </m:sup>
+                      </m:sSup>
+                    </m:oMath>
+                  </m:oMathPara>
+                </a14:m>
+                <a:endParaRPr lang="en-US" dirty="0"/>
+              </a:p>
+              <a:p>
+                <a:pPr marL="0" indent="0">
+                  <a:buNone/>
+                </a:pPr>
+                <a14:m>
+                  <m:oMathPara xmlns:m="http://schemas.openxmlformats.org/officeDocument/2006/math">
+                    <m:oMathParaPr>
+                      <m:jc m:val="centerGroup"/>
+                    </m:oMathParaPr>
+                    <m:oMath xmlns:m="http://schemas.openxmlformats.org/officeDocument/2006/math">
+                      <m:sSubSup>
+                        <m:sSubSupPr>
+                          <m:ctrlPr>
+                            <a:rPr lang="en-US" b="0" i="1" smtClean="0">
+                              <a:latin typeface="Cambria Math" panose="02040503050406030204" pitchFamily="18" charset="0"/>
+                            </a:rPr>
+                          </m:ctrlPr>
+                        </m:sSubSupPr>
+                        <m:e>
+                          <m:r>
+                            <a:rPr lang="en-US" b="1" i="0" smtClean="0">
+                              <a:latin typeface="Cambria Math" panose="02040503050406030204" pitchFamily="18" charset="0"/>
+                            </a:rPr>
+                            <m:t>𝛜</m:t>
+                          </m:r>
+                        </m:e>
+                        <m:sub>
+                          <m:r>
+                            <a:rPr lang="en-US" b="0" i="1" smtClean="0">
+                              <a:latin typeface="Cambria Math" panose="02040503050406030204" pitchFamily="18" charset="0"/>
+                            </a:rPr>
+                            <m:t>𝑡</m:t>
+                          </m:r>
+                        </m:sub>
+                        <m:sup>
+                          <m:r>
+                            <a:rPr lang="en-US" b="0" i="1" smtClean="0">
+                              <a:latin typeface="Cambria Math" panose="02040503050406030204" pitchFamily="18" charset="0"/>
+                            </a:rPr>
+                            <m:t>∗</m:t>
+                          </m:r>
+                        </m:sup>
+                      </m:sSubSup>
+                      <m:r>
+                        <a:rPr lang="en-US" b="0" i="1" smtClean="0">
+                          <a:latin typeface="Cambria Math" panose="02040503050406030204" pitchFamily="18" charset="0"/>
+                        </a:rPr>
+                        <m:t>=</m:t>
+                      </m:r>
+                      <m:r>
+                        <a:rPr lang="en-US" b="1">
+                          <a:latin typeface="Cambria Math" panose="02040503050406030204" pitchFamily="18" charset="0"/>
+                        </a:rPr>
+                        <m:t>𝐇</m:t>
+                      </m:r>
+                      <m:sSub>
+                        <m:sSubPr>
+                          <m:ctrlPr>
+                            <a:rPr lang="en-US" i="1">
+                              <a:latin typeface="Cambria Math" panose="02040503050406030204" pitchFamily="18" charset="0"/>
+                            </a:rPr>
+                          </m:ctrlPr>
+                        </m:sSubPr>
+                        <m:e>
+                          <m:r>
+                            <a:rPr lang="en-US" b="1">
+                              <a:latin typeface="Cambria Math" panose="02040503050406030204" pitchFamily="18" charset="0"/>
+                            </a:rPr>
+                            <m:t>𝛜</m:t>
+                          </m:r>
+                        </m:e>
+                        <m:sub>
+                          <m:r>
+                            <a:rPr lang="en-US" i="1">
+                              <a:latin typeface="Cambria Math" panose="02040503050406030204" pitchFamily="18" charset="0"/>
+                            </a:rPr>
+                            <m:t>𝑡</m:t>
+                          </m:r>
+                        </m:sub>
+                      </m:sSub>
+                    </m:oMath>
+                  </m:oMathPara>
+                </a14:m>
+                <a:endParaRPr lang="en-US" dirty="0"/>
+              </a:p>
+              <a:p>
+                <a:pPr marL="0" indent="0">
+                  <a:buNone/>
+                </a:pPr>
+                <a:r>
+                  <a:rPr lang="en-US" dirty="0"/>
+                  <a:t>Where:</a:t>
+                </a:r>
+              </a:p>
+              <a:p>
+                <a:pPr marL="0" indent="0">
+                  <a:buNone/>
+                </a:pPr>
+                <a14:m>
+                  <m:oMathPara xmlns:m="http://schemas.openxmlformats.org/officeDocument/2006/math">
+                    <m:oMathParaPr>
+                      <m:jc m:val="centerGroup"/>
+                    </m:oMathParaPr>
+                    <m:oMath xmlns:m="http://schemas.openxmlformats.org/officeDocument/2006/math">
+                      <m:sSub>
+                        <m:sSubPr>
+                          <m:ctrlPr>
+                            <a:rPr lang="en-US" i="1">
+                              <a:latin typeface="Cambria Math" panose="02040503050406030204" pitchFamily="18" charset="0"/>
+                            </a:rPr>
+                          </m:ctrlPr>
+                        </m:sSubPr>
+                        <m:e>
+                          <m:r>
+                            <a:rPr lang="en-US" b="1">
+                              <a:latin typeface="Cambria Math" panose="02040503050406030204" pitchFamily="18" charset="0"/>
+                            </a:rPr>
+                            <m:t>𝐱</m:t>
+                          </m:r>
+                        </m:e>
+                        <m:sub>
+                          <m:r>
+                            <a:rPr lang="en-US" i="1">
+                              <a:latin typeface="Cambria Math" panose="02040503050406030204" pitchFamily="18" charset="0"/>
+                            </a:rPr>
+                            <m:t>𝑡</m:t>
+                          </m:r>
+                          <m:r>
+                            <a:rPr lang="en-US" i="1">
+                              <a:latin typeface="Cambria Math" panose="02040503050406030204" pitchFamily="18" charset="0"/>
+                            </a:rPr>
+                            <m:t>+1</m:t>
+                          </m:r>
+                        </m:sub>
+                      </m:sSub>
+                      <m:r>
+                        <a:rPr lang="en-US" i="1">
+                          <a:latin typeface="Cambria Math" panose="02040503050406030204" pitchFamily="18" charset="0"/>
+                        </a:rPr>
+                        <m:t>=</m:t>
+                      </m:r>
+                      <m:sSub>
+                        <m:sSubPr>
+                          <m:ctrlPr>
+                            <a:rPr lang="en-US" i="1">
+                              <a:latin typeface="Cambria Math" panose="02040503050406030204" pitchFamily="18" charset="0"/>
+                            </a:rPr>
+                          </m:ctrlPr>
+                        </m:sSubPr>
+                        <m:e>
+                          <m:r>
+                            <a:rPr lang="en-US" b="1">
+                              <a:latin typeface="Cambria Math" panose="02040503050406030204" pitchFamily="18" charset="0"/>
+                            </a:rPr>
+                            <m:t>𝐱</m:t>
+                          </m:r>
+                        </m:e>
+                        <m:sub>
+                          <m:r>
+                            <a:rPr lang="en-US" i="1">
+                              <a:latin typeface="Cambria Math" panose="02040503050406030204" pitchFamily="18" charset="0"/>
+                            </a:rPr>
+                            <m:t>𝑡</m:t>
+                          </m:r>
+                        </m:sub>
+                      </m:sSub>
+                      <m:r>
+                        <a:rPr lang="en-US" i="1">
+                          <a:latin typeface="Cambria Math" panose="02040503050406030204" pitchFamily="18" charset="0"/>
+                        </a:rPr>
+                        <m:t>+</m:t>
+                      </m:r>
+                      <m:sSup>
+                        <m:sSupPr>
+                          <m:ctrlPr>
+                            <a:rPr lang="en-US" b="1" i="1">
+                              <a:latin typeface="Cambria Math" panose="02040503050406030204" pitchFamily="18" charset="0"/>
+                            </a:rPr>
+                          </m:ctrlPr>
+                        </m:sSupPr>
+                        <m:e>
+                          <m:r>
+                            <a:rPr lang="en-US" b="1">
+                              <a:latin typeface="Cambria Math" panose="02040503050406030204" pitchFamily="18" charset="0"/>
+                            </a:rPr>
+                            <m:t>𝐋</m:t>
+                          </m:r>
+                        </m:e>
+                        <m:sup>
+                          <m:r>
+                            <a:rPr lang="en-US" b="1">
+                              <a:latin typeface="Cambria Math" panose="02040503050406030204" pitchFamily="18" charset="0"/>
+                            </a:rPr>
+                            <m:t>∗</m:t>
+                          </m:r>
+                        </m:sup>
+                      </m:sSup>
+                      <m:sSubSup>
+                        <m:sSubSupPr>
+                          <m:ctrlPr>
+                            <a:rPr lang="en-US" i="1">
+                              <a:latin typeface="Cambria Math" panose="02040503050406030204" pitchFamily="18" charset="0"/>
+                            </a:rPr>
+                          </m:ctrlPr>
+                        </m:sSubSupPr>
+                        <m:e>
+                          <m:r>
+                            <a:rPr lang="en-US" b="1">
+                              <a:latin typeface="Cambria Math" panose="02040503050406030204" pitchFamily="18" charset="0"/>
+                            </a:rPr>
+                            <m:t>𝛜</m:t>
+                          </m:r>
+                        </m:e>
+                        <m:sub>
+                          <m:r>
+                            <a:rPr lang="en-US" i="1">
+                              <a:latin typeface="Cambria Math" panose="02040503050406030204" pitchFamily="18" charset="0"/>
+                            </a:rPr>
+                            <m:t>𝑡</m:t>
+                          </m:r>
+                        </m:sub>
+                        <m:sup>
+                          <m:r>
+                            <a:rPr lang="en-US" i="1">
+                              <a:latin typeface="Cambria Math" panose="02040503050406030204" pitchFamily="18" charset="0"/>
+                            </a:rPr>
+                            <m:t>∗</m:t>
+                          </m:r>
+                        </m:sup>
+                      </m:sSubSup>
+                    </m:oMath>
+                  </m:oMathPara>
+                </a14:m>
+                <a:endParaRPr lang="en-US" dirty="0"/>
+              </a:p>
+              <a:p>
+                <a:pPr marL="0" indent="0">
+                  <a:buNone/>
+                </a:pPr>
+                <a:r>
+                  <a:rPr lang="en-US" dirty="0"/>
+                  <a:t>And rotation </a:t>
+                </a:r>
+                <a14:m>
+                  <m:oMath xmlns:m="http://schemas.openxmlformats.org/officeDocument/2006/math">
+                    <m:r>
+                      <a:rPr lang="en-US" b="1" i="0" smtClean="0">
+                        <a:latin typeface="Cambria Math" panose="02040503050406030204" pitchFamily="18" charset="0"/>
+                      </a:rPr>
+                      <m:t>𝐇</m:t>
+                    </m:r>
+                  </m:oMath>
+                </a14:m>
+                <a:r>
+                  <a:rPr lang="en-US" dirty="0"/>
+                  <a:t> is calculated as:</a:t>
+                </a:r>
+              </a:p>
+              <a:p>
+                <a:r>
+                  <a:rPr lang="en-US" dirty="0"/>
+                  <a:t>Varimax – Associate each factor with as few responses as possible</a:t>
+                </a:r>
+              </a:p>
+              <a:p>
+                <a:r>
+                  <a:rPr lang="en-US" dirty="0"/>
+                  <a:t>“PCA” – Associate first factor with maximum variance, second with most variance conditional on 1</a:t>
+                </a:r>
+                <a:r>
+                  <a:rPr lang="en-US" baseline="30000" dirty="0"/>
+                  <a:t>st</a:t>
+                </a:r>
+                <a:r>
+                  <a:rPr lang="en-US" dirty="0"/>
+                  <a:t>, </a:t>
+                </a:r>
+                <a:r>
+                  <a:rPr lang="en-US" dirty="0" err="1"/>
+                  <a:t>etc</a:t>
+                </a:r>
+                <a:endParaRPr lang="en-US" dirty="0"/>
+              </a:p>
+              <a:p>
+                <a:pPr marL="0" indent="0">
+                  <a:buNone/>
+                </a:pPr>
+                <a:endParaRPr lang="en-US" dirty="0"/>
+              </a:p>
+            </p:txBody>
+          </p:sp>
+        </mc:Choice>
+        <mc:Fallback>
+          <p:sp>
+            <p:nvSpPr>
+              <p:cNvPr id="4" name="Content Placeholder 2">
+                <a:extLst>
+                  <a:ext uri="{FF2B5EF4-FFF2-40B4-BE49-F238E27FC236}">
+                    <a16:creationId xmlns:a16="http://schemas.microsoft.com/office/drawing/2014/main" id="{A83154BA-CCBC-46E9-901F-175DD1B1AEB6}"/>
+                  </a:ext>
+                </a:extLst>
+              </p:cNvPr>
+              <p:cNvSpPr txBox="1">
+                <a:spLocks noRot="1" noChangeAspect="1" noMove="1" noResize="1" noEditPoints="1" noAdjustHandles="1" noChangeArrowheads="1" noChangeShapeType="1" noTextEdit="1"/>
+              </p:cNvSpPr>
+              <p:nvPr/>
+            </p:nvSpPr>
+            <p:spPr>
+              <a:xfrm>
+                <a:off x="0" y="1549820"/>
+                <a:ext cx="9144000" cy="5308180"/>
+              </a:xfrm>
+              <a:prstGeom prst="rect">
+                <a:avLst/>
+              </a:prstGeom>
+              <a:blipFill>
+                <a:blip r:embed="rId2"/>
+                <a:stretch>
+                  <a:fillRect l="-533" t="-1493"/>
+                </a:stretch>
+              </a:blipFill>
+            </p:spPr>
+            <p:txBody>
+              <a:bodyPr/>
+              <a:lstStyle/>
+              <a:p>
+                <a:r>
+                  <a:rPr lang="en-US">
+                    <a:noFill/>
+                  </a:rPr>
+                  <a:t> </a:t>
+                </a:r>
+              </a:p>
+            </p:txBody>
+          </p:sp>
+        </mc:Fallback>
+      </mc:AlternateContent>
+    </p:spTree>
+    <p:extLst>
+      <p:ext uri="{BB962C8B-B14F-4D97-AF65-F5344CB8AC3E}">
+        <p14:creationId xmlns:p14="http://schemas.microsoft.com/office/powerpoint/2010/main" val="2079580614"/>
       </p:ext>
     </p:extLst>
   </p:cSld>

</xml_diff>